<commit_message>
small change to presenation - Bing found error
</commit_message>
<xml_diff>
--- a/Team_Project1.pptx
+++ b/Team_Project1.pptx
@@ -8728,8 +8728,37 @@
                   <a:schemeClr val="accent6"/>
                 </a:solidFill>
               </a:rPr>
-              <a:t>Range is around 6,000, the majority is around 4,000</a:t>
-            </a:r>
+              <a:t>Range is </a:t>
+            </a:r>
+            <a:r>
+              <a:rPr lang="en-US">
+                <a:solidFill>
+                  <a:schemeClr val="accent6"/>
+                </a:solidFill>
+              </a:rPr>
+              <a:t>around 60,000</a:t>
+            </a:r>
+            <a:r>
+              <a:rPr lang="en-US" dirty="0">
+                <a:solidFill>
+                  <a:schemeClr val="accent6"/>
+                </a:solidFill>
+              </a:rPr>
+              <a:t>, the majority is </a:t>
+            </a:r>
+            <a:r>
+              <a:rPr lang="en-US">
+                <a:solidFill>
+                  <a:schemeClr val="accent6"/>
+                </a:solidFill>
+              </a:rPr>
+              <a:t>around 40,000</a:t>
+            </a:r>
+            <a:endParaRPr lang="en-US" dirty="0">
+              <a:solidFill>
+                <a:schemeClr val="accent6"/>
+              </a:solidFill>
+            </a:endParaRPr>
           </a:p>
         </p:txBody>
       </p:sp>

</xml_diff>